<commit_message>
Adding a outlier detection before the PLSR calibration. It uses a LOO validation to identify the most uncertain points and remove them from the total dataset
</commit_message>
<xml_diff>
--- a/Overal_PLSR_modeling.pptx
+++ b/Overal_PLSR_modeling.pptx
@@ -259,7 +259,7 @@
           <a:p>
             <a:fld id="{F3787539-ED79-4958-8487-251D7A27B661}" type="datetimeFigureOut">
               <a:rPr lang="en-US" smtClean="0"/>
-              <a:t>10/14/2021</a:t>
+              <a:t>11/8/2021</a:t>
             </a:fld>
             <a:endParaRPr lang="en-US"/>
           </a:p>
@@ -457,7 +457,7 @@
           <a:p>
             <a:fld id="{F3787539-ED79-4958-8487-251D7A27B661}" type="datetimeFigureOut">
               <a:rPr lang="en-US" smtClean="0"/>
-              <a:t>10/14/2021</a:t>
+              <a:t>11/8/2021</a:t>
             </a:fld>
             <a:endParaRPr lang="en-US"/>
           </a:p>
@@ -665,7 +665,7 @@
           <a:p>
             <a:fld id="{F3787539-ED79-4958-8487-251D7A27B661}" type="datetimeFigureOut">
               <a:rPr lang="en-US" smtClean="0"/>
-              <a:t>10/14/2021</a:t>
+              <a:t>11/8/2021</a:t>
             </a:fld>
             <a:endParaRPr lang="en-US"/>
           </a:p>
@@ -863,7 +863,7 @@
           <a:p>
             <a:fld id="{F3787539-ED79-4958-8487-251D7A27B661}" type="datetimeFigureOut">
               <a:rPr lang="en-US" smtClean="0"/>
-              <a:t>10/14/2021</a:t>
+              <a:t>11/8/2021</a:t>
             </a:fld>
             <a:endParaRPr lang="en-US"/>
           </a:p>
@@ -1138,7 +1138,7 @@
           <a:p>
             <a:fld id="{F3787539-ED79-4958-8487-251D7A27B661}" type="datetimeFigureOut">
               <a:rPr lang="en-US" smtClean="0"/>
-              <a:t>10/14/2021</a:t>
+              <a:t>11/8/2021</a:t>
             </a:fld>
             <a:endParaRPr lang="en-US"/>
           </a:p>
@@ -1403,7 +1403,7 @@
           <a:p>
             <a:fld id="{F3787539-ED79-4958-8487-251D7A27B661}" type="datetimeFigureOut">
               <a:rPr lang="en-US" smtClean="0"/>
-              <a:t>10/14/2021</a:t>
+              <a:t>11/8/2021</a:t>
             </a:fld>
             <a:endParaRPr lang="en-US"/>
           </a:p>
@@ -1815,7 +1815,7 @@
           <a:p>
             <a:fld id="{F3787539-ED79-4958-8487-251D7A27B661}" type="datetimeFigureOut">
               <a:rPr lang="en-US" smtClean="0"/>
-              <a:t>10/14/2021</a:t>
+              <a:t>11/8/2021</a:t>
             </a:fld>
             <a:endParaRPr lang="en-US"/>
           </a:p>
@@ -1956,7 +1956,7 @@
           <a:p>
             <a:fld id="{F3787539-ED79-4958-8487-251D7A27B661}" type="datetimeFigureOut">
               <a:rPr lang="en-US" smtClean="0"/>
-              <a:t>10/14/2021</a:t>
+              <a:t>11/8/2021</a:t>
             </a:fld>
             <a:endParaRPr lang="en-US"/>
           </a:p>
@@ -2069,7 +2069,7 @@
           <a:p>
             <a:fld id="{F3787539-ED79-4958-8487-251D7A27B661}" type="datetimeFigureOut">
               <a:rPr lang="en-US" smtClean="0"/>
-              <a:t>10/14/2021</a:t>
+              <a:t>11/8/2021</a:t>
             </a:fld>
             <a:endParaRPr lang="en-US"/>
           </a:p>
@@ -2380,7 +2380,7 @@
           <a:p>
             <a:fld id="{F3787539-ED79-4958-8487-251D7A27B661}" type="datetimeFigureOut">
               <a:rPr lang="en-US" smtClean="0"/>
-              <a:t>10/14/2021</a:t>
+              <a:t>11/8/2021</a:t>
             </a:fld>
             <a:endParaRPr lang="en-US"/>
           </a:p>
@@ -2668,7 +2668,7 @@
           <a:p>
             <a:fld id="{F3787539-ED79-4958-8487-251D7A27B661}" type="datetimeFigureOut">
               <a:rPr lang="en-US" smtClean="0"/>
-              <a:t>10/14/2021</a:t>
+              <a:t>11/8/2021</a:t>
             </a:fld>
             <a:endParaRPr lang="en-US"/>
           </a:p>
@@ -2909,7 +2909,7 @@
           <a:p>
             <a:fld id="{F3787539-ED79-4958-8487-251D7A27B661}" type="datetimeFigureOut">
               <a:rPr lang="en-US" smtClean="0"/>
-              <a:t>10/14/2021</a:t>
+              <a:t>11/8/2021</a:t>
             </a:fld>
             <a:endParaRPr lang="en-US"/>
           </a:p>
@@ -3328,10 +3328,10 @@
       </p:grpSpPr>
       <p:sp>
         <p:nvSpPr>
-          <p:cNvPr id="4" name="Rectangle 3">
-            <a:extLst>
-              <a:ext uri="{FF2B5EF4-FFF2-40B4-BE49-F238E27FC236}">
-                <a16:creationId xmlns:a16="http://schemas.microsoft.com/office/drawing/2014/main" id="{6B12406E-F5E3-4ECB-BEFE-B039A6FE46BE}"/>
+          <p:cNvPr id="10" name="Rectangle 9">
+            <a:extLst>
+              <a:ext uri="{FF2B5EF4-FFF2-40B4-BE49-F238E27FC236}">
+                <a16:creationId xmlns:a16="http://schemas.microsoft.com/office/drawing/2014/main" id="{6E387500-6932-4F7F-B6FD-E4E0A95242C3}"/>
               </a:ext>
             </a:extLst>
           </p:cNvPr>
@@ -3340,7 +3340,7 @@
         </p:nvSpPr>
         <p:spPr>
           <a:xfrm>
-            <a:off x="972589" y="304338"/>
+            <a:off x="1147156" y="3022600"/>
             <a:ext cx="3424844" cy="629920"/>
           </a:xfrm>
           <a:prstGeom prst="rect">
@@ -3377,22 +3377,22 @@
       </p:sp>
       <p:cxnSp>
         <p:nvCxnSpPr>
-          <p:cNvPr id="7" name="Straight Arrow Connector 6">
-            <a:extLst>
-              <a:ext uri="{FF2B5EF4-FFF2-40B4-BE49-F238E27FC236}">
-                <a16:creationId xmlns:a16="http://schemas.microsoft.com/office/drawing/2014/main" id="{9A8077AF-2CBD-4F0D-A904-580BAFC25428}"/>
+          <p:cNvPr id="11" name="Straight Arrow Connector 10">
+            <a:extLst>
+              <a:ext uri="{FF2B5EF4-FFF2-40B4-BE49-F238E27FC236}">
+                <a16:creationId xmlns:a16="http://schemas.microsoft.com/office/drawing/2014/main" id="{E58F4195-B150-4589-B0DE-9ECD46828FB2}"/>
               </a:ext>
             </a:extLst>
           </p:cNvPr>
           <p:cNvCxnSpPr>
             <a:cxnSpLocks/>
-            <a:stCxn id="4" idx="2"/>
+            <a:stCxn id="10" idx="2"/>
           </p:cNvCxnSpPr>
           <p:nvPr/>
         </p:nvCxnSpPr>
         <p:spPr>
           <a:xfrm>
-            <a:off x="2685011" y="934258"/>
+            <a:off x="2859578" y="3652520"/>
             <a:ext cx="0" cy="678411"/>
           </a:xfrm>
           <a:prstGeom prst="straightConnector1">
@@ -3419,10 +3419,10 @@
       </p:cxnSp>
       <p:sp>
         <p:nvSpPr>
-          <p:cNvPr id="23" name="Rectangle 22">
-            <a:extLst>
-              <a:ext uri="{FF2B5EF4-FFF2-40B4-BE49-F238E27FC236}">
-                <a16:creationId xmlns:a16="http://schemas.microsoft.com/office/drawing/2014/main" id="{57EA9EA8-0B2C-4A97-98E9-933D3E8167E2}"/>
+          <p:cNvPr id="12" name="Rectangle 11">
+            <a:extLst>
+              <a:ext uri="{FF2B5EF4-FFF2-40B4-BE49-F238E27FC236}">
+                <a16:creationId xmlns:a16="http://schemas.microsoft.com/office/drawing/2014/main" id="{1840597C-FF27-4396-9BCD-9AAFF1DDBBD8}"/>
               </a:ext>
             </a:extLst>
           </p:cNvPr>
@@ -3431,7 +3431,7 @@
         </p:nvSpPr>
         <p:spPr>
           <a:xfrm>
-            <a:off x="972589" y="1612669"/>
+            <a:off x="1147156" y="4330931"/>
             <a:ext cx="3424844" cy="629920"/>
           </a:xfrm>
           <a:prstGeom prst="rect">
@@ -3468,10 +3468,10 @@
       </p:sp>
       <p:sp>
         <p:nvSpPr>
-          <p:cNvPr id="26" name="Rectangle 25">
-            <a:extLst>
-              <a:ext uri="{FF2B5EF4-FFF2-40B4-BE49-F238E27FC236}">
-                <a16:creationId xmlns:a16="http://schemas.microsoft.com/office/drawing/2014/main" id="{A9E454AF-EA5E-4192-872F-8B5A5506238C}"/>
+          <p:cNvPr id="13" name="Rectangle 12">
+            <a:extLst>
+              <a:ext uri="{FF2B5EF4-FFF2-40B4-BE49-F238E27FC236}">
+                <a16:creationId xmlns:a16="http://schemas.microsoft.com/office/drawing/2014/main" id="{33484724-D8A8-4CE7-9683-6CCA7A8C22EB}"/>
               </a:ext>
             </a:extLst>
           </p:cNvPr>
@@ -3480,7 +3480,7 @@
         </p:nvSpPr>
         <p:spPr>
           <a:xfrm>
-            <a:off x="5888182" y="2144221"/>
+            <a:off x="6062749" y="3022600"/>
             <a:ext cx="3424844" cy="629920"/>
           </a:xfrm>
           <a:prstGeom prst="rect">
@@ -3517,10 +3517,10 @@
       </p:sp>
       <p:sp>
         <p:nvSpPr>
-          <p:cNvPr id="28" name="Rectangle 27">
-            <a:extLst>
-              <a:ext uri="{FF2B5EF4-FFF2-40B4-BE49-F238E27FC236}">
-                <a16:creationId xmlns:a16="http://schemas.microsoft.com/office/drawing/2014/main" id="{4FB2B388-9206-423E-B9EB-4DA8484BF35A}"/>
+          <p:cNvPr id="14" name="Rectangle 13">
+            <a:extLst>
+              <a:ext uri="{FF2B5EF4-FFF2-40B4-BE49-F238E27FC236}">
+                <a16:creationId xmlns:a16="http://schemas.microsoft.com/office/drawing/2014/main" id="{AB8CCE88-D72B-4540-A568-D1C84EC6C1C8}"/>
               </a:ext>
             </a:extLst>
           </p:cNvPr>
@@ -3529,7 +3529,7 @@
         </p:nvSpPr>
         <p:spPr>
           <a:xfrm>
-            <a:off x="5888182" y="3724102"/>
+            <a:off x="6062749" y="4330931"/>
             <a:ext cx="3424844" cy="997988"/>
           </a:xfrm>
           <a:prstGeom prst="rect">
@@ -3564,6 +3564,276 @@
           </a:p>
         </p:txBody>
       </p:sp>
+      <p:cxnSp>
+        <p:nvCxnSpPr>
+          <p:cNvPr id="15" name="Straight Arrow Connector 14">
+            <a:extLst>
+              <a:ext uri="{FF2B5EF4-FFF2-40B4-BE49-F238E27FC236}">
+                <a16:creationId xmlns:a16="http://schemas.microsoft.com/office/drawing/2014/main" id="{5FE9BA35-4BA7-460D-A742-4DDA091228CA}"/>
+              </a:ext>
+            </a:extLst>
+          </p:cNvPr>
+          <p:cNvCxnSpPr>
+            <a:cxnSpLocks/>
+            <a:stCxn id="13" idx="2"/>
+            <a:endCxn id="14" idx="0"/>
+          </p:cNvCxnSpPr>
+          <p:nvPr/>
+        </p:nvCxnSpPr>
+        <p:spPr>
+          <a:xfrm>
+            <a:off x="7775171" y="3652520"/>
+            <a:ext cx="0" cy="678411"/>
+          </a:xfrm>
+          <a:prstGeom prst="straightConnector1">
+            <a:avLst/>
+          </a:prstGeom>
+          <a:ln>
+            <a:tailEnd type="triangle"/>
+          </a:ln>
+        </p:spPr>
+        <p:style>
+          <a:lnRef idx="1">
+            <a:schemeClr val="accent1"/>
+          </a:lnRef>
+          <a:fillRef idx="0">
+            <a:schemeClr val="accent1"/>
+          </a:fillRef>
+          <a:effectRef idx="0">
+            <a:schemeClr val="accent1"/>
+          </a:effectRef>
+          <a:fontRef idx="minor">
+            <a:schemeClr val="tx1"/>
+          </a:fontRef>
+        </p:style>
+      </p:cxnSp>
+      <p:sp>
+        <p:nvSpPr>
+          <p:cNvPr id="16" name="Rectangle 15">
+            <a:extLst>
+              <a:ext uri="{FF2B5EF4-FFF2-40B4-BE49-F238E27FC236}">
+                <a16:creationId xmlns:a16="http://schemas.microsoft.com/office/drawing/2014/main" id="{4425EE10-351C-4936-B8C0-459D260563A1}"/>
+              </a:ext>
+            </a:extLst>
+          </p:cNvPr>
+          <p:cNvSpPr/>
+          <p:nvPr/>
+        </p:nvSpPr>
+        <p:spPr>
+          <a:xfrm>
+            <a:off x="4089862" y="745144"/>
+            <a:ext cx="3424844" cy="629920"/>
+          </a:xfrm>
+          <a:prstGeom prst="rect">
+            <a:avLst/>
+          </a:prstGeom>
+        </p:spPr>
+        <p:style>
+          <a:lnRef idx="2">
+            <a:schemeClr val="accent1">
+              <a:shade val="50000"/>
+            </a:schemeClr>
+          </a:lnRef>
+          <a:fillRef idx="1">
+            <a:schemeClr val="accent1"/>
+          </a:fillRef>
+          <a:effectRef idx="0">
+            <a:schemeClr val="accent1"/>
+          </a:effectRef>
+          <a:fontRef idx="minor">
+            <a:schemeClr val="lt1"/>
+          </a:fontRef>
+        </p:style>
+        <p:txBody>
+          <a:bodyPr rtlCol="0" anchor="ctr"/>
+          <a:lstStyle/>
+          <a:p>
+            <a:pPr algn="ctr"/>
+            <a:r>
+              <a:rPr lang="en-US" dirty="0"/>
+              <a:t>Variable transformation to normalize its distribution</a:t>
+            </a:r>
+          </a:p>
+        </p:txBody>
+      </p:sp>
+      <p:sp>
+        <p:nvSpPr>
+          <p:cNvPr id="17" name="Rectangle 16">
+            <a:extLst>
+              <a:ext uri="{FF2B5EF4-FFF2-40B4-BE49-F238E27FC236}">
+                <a16:creationId xmlns:a16="http://schemas.microsoft.com/office/drawing/2014/main" id="{B2E1C723-C73B-4CDA-93FB-1F0CF5C62742}"/>
+              </a:ext>
+            </a:extLst>
+          </p:cNvPr>
+          <p:cNvSpPr/>
+          <p:nvPr/>
+        </p:nvSpPr>
+        <p:spPr>
+          <a:xfrm>
+            <a:off x="4089862" y="1859857"/>
+            <a:ext cx="3424844" cy="629920"/>
+          </a:xfrm>
+          <a:prstGeom prst="rect">
+            <a:avLst/>
+          </a:prstGeom>
+        </p:spPr>
+        <p:style>
+          <a:lnRef idx="2">
+            <a:schemeClr val="accent1">
+              <a:shade val="50000"/>
+            </a:schemeClr>
+          </a:lnRef>
+          <a:fillRef idx="1">
+            <a:schemeClr val="accent1"/>
+          </a:fillRef>
+          <a:effectRef idx="0">
+            <a:schemeClr val="accent1"/>
+          </a:effectRef>
+          <a:fontRef idx="minor">
+            <a:schemeClr val="lt1"/>
+          </a:fontRef>
+        </p:style>
+        <p:txBody>
+          <a:bodyPr rtlCol="0" anchor="ctr"/>
+          <a:lstStyle/>
+          <a:p>
+            <a:pPr algn="ctr"/>
+            <a:r>
+              <a:rPr lang="en-US" dirty="0"/>
+              <a:t>Identifying strong outliers using a Leave-One-Out PLSR modeling</a:t>
+            </a:r>
+          </a:p>
+        </p:txBody>
+      </p:sp>
+      <p:cxnSp>
+        <p:nvCxnSpPr>
+          <p:cNvPr id="18" name="Straight Arrow Connector 17">
+            <a:extLst>
+              <a:ext uri="{FF2B5EF4-FFF2-40B4-BE49-F238E27FC236}">
+                <a16:creationId xmlns:a16="http://schemas.microsoft.com/office/drawing/2014/main" id="{412EE023-555D-461D-8875-088153ED0176}"/>
+              </a:ext>
+            </a:extLst>
+          </p:cNvPr>
+          <p:cNvCxnSpPr>
+            <a:cxnSpLocks/>
+            <a:stCxn id="16" idx="2"/>
+            <a:endCxn id="17" idx="0"/>
+          </p:cNvCxnSpPr>
+          <p:nvPr/>
+        </p:nvCxnSpPr>
+        <p:spPr>
+          <a:xfrm>
+            <a:off x="5802284" y="1375064"/>
+            <a:ext cx="0" cy="484793"/>
+          </a:xfrm>
+          <a:prstGeom prst="straightConnector1">
+            <a:avLst/>
+          </a:prstGeom>
+          <a:ln>
+            <a:tailEnd type="triangle"/>
+          </a:ln>
+        </p:spPr>
+        <p:style>
+          <a:lnRef idx="1">
+            <a:schemeClr val="accent1"/>
+          </a:lnRef>
+          <a:fillRef idx="0">
+            <a:schemeClr val="accent1"/>
+          </a:fillRef>
+          <a:effectRef idx="0">
+            <a:schemeClr val="accent1"/>
+          </a:effectRef>
+          <a:fontRef idx="minor">
+            <a:schemeClr val="tx1"/>
+          </a:fontRef>
+        </p:style>
+      </p:cxnSp>
+      <p:cxnSp>
+        <p:nvCxnSpPr>
+          <p:cNvPr id="21" name="Straight Arrow Connector 20">
+            <a:extLst>
+              <a:ext uri="{FF2B5EF4-FFF2-40B4-BE49-F238E27FC236}">
+                <a16:creationId xmlns:a16="http://schemas.microsoft.com/office/drawing/2014/main" id="{2C6558EB-F0D4-4A06-A59E-69F06BB81ECA}"/>
+              </a:ext>
+            </a:extLst>
+          </p:cNvPr>
+          <p:cNvCxnSpPr>
+            <a:cxnSpLocks/>
+            <a:stCxn id="17" idx="2"/>
+            <a:endCxn id="10" idx="0"/>
+          </p:cNvCxnSpPr>
+          <p:nvPr/>
+        </p:nvCxnSpPr>
+        <p:spPr>
+          <a:xfrm flipH="1">
+            <a:off x="2859578" y="2489777"/>
+            <a:ext cx="2942706" cy="532823"/>
+          </a:xfrm>
+          <a:prstGeom prst="straightConnector1">
+            <a:avLst/>
+          </a:prstGeom>
+          <a:ln>
+            <a:tailEnd type="triangle"/>
+          </a:ln>
+        </p:spPr>
+        <p:style>
+          <a:lnRef idx="1">
+            <a:schemeClr val="accent1"/>
+          </a:lnRef>
+          <a:fillRef idx="0">
+            <a:schemeClr val="accent1"/>
+          </a:fillRef>
+          <a:effectRef idx="0">
+            <a:schemeClr val="accent1"/>
+          </a:effectRef>
+          <a:fontRef idx="minor">
+            <a:schemeClr val="tx1"/>
+          </a:fontRef>
+        </p:style>
+      </p:cxnSp>
+      <p:cxnSp>
+        <p:nvCxnSpPr>
+          <p:cNvPr id="24" name="Straight Arrow Connector 23">
+            <a:extLst>
+              <a:ext uri="{FF2B5EF4-FFF2-40B4-BE49-F238E27FC236}">
+                <a16:creationId xmlns:a16="http://schemas.microsoft.com/office/drawing/2014/main" id="{D3B59445-3F01-4013-BC2F-CCBA773D94EA}"/>
+              </a:ext>
+            </a:extLst>
+          </p:cNvPr>
+          <p:cNvCxnSpPr>
+            <a:cxnSpLocks/>
+            <a:stCxn id="17" idx="2"/>
+            <a:endCxn id="13" idx="0"/>
+          </p:cNvCxnSpPr>
+          <p:nvPr/>
+        </p:nvCxnSpPr>
+        <p:spPr>
+          <a:xfrm>
+            <a:off x="5802284" y="2489777"/>
+            <a:ext cx="1972887" cy="532823"/>
+          </a:xfrm>
+          <a:prstGeom prst="straightConnector1">
+            <a:avLst/>
+          </a:prstGeom>
+          <a:ln>
+            <a:tailEnd type="triangle"/>
+          </a:ln>
+        </p:spPr>
+        <p:style>
+          <a:lnRef idx="1">
+            <a:schemeClr val="accent1"/>
+          </a:lnRef>
+          <a:fillRef idx="0">
+            <a:schemeClr val="accent1"/>
+          </a:fillRef>
+          <a:effectRef idx="0">
+            <a:schemeClr val="accent1"/>
+          </a:effectRef>
+          <a:fontRef idx="minor">
+            <a:schemeClr val="tx1"/>
+          </a:fontRef>
+        </p:style>
+      </p:cxnSp>
     </p:spTree>
     <p:extLst>
       <p:ext uri="{BB962C8B-B14F-4D97-AF65-F5344CB8AC3E}">

</xml_diff>